<commit_message>
Final version for upload
JPGs for images, minimized css
</commit_message>
<xml_diff>
--- a/docs/JamieAbraham-CV-Rebellion-2018.pptx
+++ b/docs/JamieAbraham-CV-Rebellion-2018.pptx
@@ -254,7 +254,7 @@
           <a:p>
             <a:fld id="{84C74417-11DD-4757-A00A-D272797CF304}" type="datetimeFigureOut">
               <a:rPr lang="en-GB" smtClean="0"/>
-              <a:t>20/02/2018</a:t>
+              <a:t>09/03/2018</a:t>
             </a:fld>
             <a:endParaRPr lang="en-GB"/>
           </a:p>
@@ -424,7 +424,7 @@
           <a:p>
             <a:fld id="{84C74417-11DD-4757-A00A-D272797CF304}" type="datetimeFigureOut">
               <a:rPr lang="en-GB" smtClean="0"/>
-              <a:t>20/02/2018</a:t>
+              <a:t>09/03/2018</a:t>
             </a:fld>
             <a:endParaRPr lang="en-GB"/>
           </a:p>
@@ -604,7 +604,7 @@
           <a:p>
             <a:fld id="{84C74417-11DD-4757-A00A-D272797CF304}" type="datetimeFigureOut">
               <a:rPr lang="en-GB" smtClean="0"/>
-              <a:t>20/02/2018</a:t>
+              <a:t>09/03/2018</a:t>
             </a:fld>
             <a:endParaRPr lang="en-GB"/>
           </a:p>
@@ -774,7 +774,7 @@
           <a:p>
             <a:fld id="{84C74417-11DD-4757-A00A-D272797CF304}" type="datetimeFigureOut">
               <a:rPr lang="en-GB" smtClean="0"/>
-              <a:t>20/02/2018</a:t>
+              <a:t>09/03/2018</a:t>
             </a:fld>
             <a:endParaRPr lang="en-GB"/>
           </a:p>
@@ -1018,7 +1018,7 @@
           <a:p>
             <a:fld id="{84C74417-11DD-4757-A00A-D272797CF304}" type="datetimeFigureOut">
               <a:rPr lang="en-GB" smtClean="0"/>
-              <a:t>20/02/2018</a:t>
+              <a:t>09/03/2018</a:t>
             </a:fld>
             <a:endParaRPr lang="en-GB"/>
           </a:p>
@@ -1250,7 +1250,7 @@
           <a:p>
             <a:fld id="{84C74417-11DD-4757-A00A-D272797CF304}" type="datetimeFigureOut">
               <a:rPr lang="en-GB" smtClean="0"/>
-              <a:t>20/02/2018</a:t>
+              <a:t>09/03/2018</a:t>
             </a:fld>
             <a:endParaRPr lang="en-GB"/>
           </a:p>
@@ -1617,7 +1617,7 @@
           <a:p>
             <a:fld id="{84C74417-11DD-4757-A00A-D272797CF304}" type="datetimeFigureOut">
               <a:rPr lang="en-GB" smtClean="0"/>
-              <a:t>20/02/2018</a:t>
+              <a:t>09/03/2018</a:t>
             </a:fld>
             <a:endParaRPr lang="en-GB"/>
           </a:p>
@@ -1735,7 +1735,7 @@
           <a:p>
             <a:fld id="{84C74417-11DD-4757-A00A-D272797CF304}" type="datetimeFigureOut">
               <a:rPr lang="en-GB" smtClean="0"/>
-              <a:t>20/02/2018</a:t>
+              <a:t>09/03/2018</a:t>
             </a:fld>
             <a:endParaRPr lang="en-GB"/>
           </a:p>
@@ -1830,7 +1830,7 @@
           <a:p>
             <a:fld id="{84C74417-11DD-4757-A00A-D272797CF304}" type="datetimeFigureOut">
               <a:rPr lang="en-GB" smtClean="0"/>
-              <a:t>20/02/2018</a:t>
+              <a:t>09/03/2018</a:t>
             </a:fld>
             <a:endParaRPr lang="en-GB"/>
           </a:p>
@@ -2107,7 +2107,7 @@
           <a:p>
             <a:fld id="{84C74417-11DD-4757-A00A-D272797CF304}" type="datetimeFigureOut">
               <a:rPr lang="en-GB" smtClean="0"/>
-              <a:t>20/02/2018</a:t>
+              <a:t>09/03/2018</a:t>
             </a:fld>
             <a:endParaRPr lang="en-GB"/>
           </a:p>
@@ -2364,7 +2364,7 @@
           <a:p>
             <a:fld id="{84C74417-11DD-4757-A00A-D272797CF304}" type="datetimeFigureOut">
               <a:rPr lang="en-GB" smtClean="0"/>
-              <a:t>20/02/2018</a:t>
+              <a:t>09/03/2018</a:t>
             </a:fld>
             <a:endParaRPr lang="en-GB"/>
           </a:p>
@@ -2580,7 +2580,7 @@
           <a:p>
             <a:fld id="{84C74417-11DD-4757-A00A-D272797CF304}" type="datetimeFigureOut">
               <a:rPr lang="en-GB" smtClean="0"/>
-              <a:t>20/02/2018</a:t>
+              <a:t>09/03/2018</a:t>
             </a:fld>
             <a:endParaRPr lang="en-GB"/>
           </a:p>
@@ -3316,7 +3316,7 @@
                 </a:solidFill>
                 <a:latin typeface="Raleway-v4020 Medium" panose="00000600000000000000" pitchFamily="50" charset="0"/>
               </a:rPr>
-              <a:t>Angular</a:t>
+              <a:t>(Angular</a:t>
             </a:r>
             <a:r>
               <a:rPr lang="en-GB" sz="1000" dirty="0">
@@ -3335,6 +3335,27 @@
                 <a:latin typeface="Raleway-v4020 Medium" panose="00000600000000000000" pitchFamily="50" charset="0"/>
               </a:rPr>
               <a:t>Vue</a:t>
+            </a:r>
+            <a:r>
+              <a:rPr lang="en-GB" sz="1000" dirty="0" smtClean="0">
+                <a:solidFill>
+                  <a:srgbClr val="DADAD9"/>
+                </a:solidFill>
+                <a:latin typeface="Raleway-v4020 Medium" panose="00000600000000000000" pitchFamily="50" charset="0"/>
+              </a:rPr>
+              <a:t>)</a:t>
+            </a:r>
+          </a:p>
+          <a:p>
+            <a:pPr algn="ctr"/>
+            <a:r>
+              <a:rPr lang="en-GB" sz="1000" smtClean="0">
+                <a:solidFill>
+                  <a:srgbClr val="DADAD9"/>
+                </a:solidFill>
+                <a:latin typeface="Raleway-v4020 Medium" panose="00000600000000000000" pitchFamily="50" charset="0"/>
+              </a:rPr>
+              <a:t>jQuery</a:t>
             </a:r>
             <a:endParaRPr lang="en-GB" sz="1000" dirty="0">
               <a:solidFill>
@@ -3388,25 +3409,13 @@
           <a:p>
             <a:pPr lvl="0" algn="ctr"/>
             <a:r>
-              <a:rPr lang="en-GB" sz="1000" dirty="0">
+              <a:rPr lang="en-GB" sz="1000" dirty="0" smtClean="0">
                 <a:solidFill>
                   <a:srgbClr val="DADAD9"/>
                 </a:solidFill>
                 <a:latin typeface="Raleway-v4020 Medium" panose="00000600000000000000" pitchFamily="50" charset="0"/>
               </a:rPr>
               <a:t>MS-SQL</a:t>
-            </a:r>
-          </a:p>
-          <a:p>
-            <a:pPr lvl="0" algn="ctr"/>
-            <a:r>
-              <a:rPr lang="en-GB" sz="1000" dirty="0" smtClean="0">
-                <a:solidFill>
-                  <a:srgbClr val="DADAD9"/>
-                </a:solidFill>
-                <a:latin typeface="Raleway-v4020 Medium" panose="00000600000000000000" pitchFamily="50" charset="0"/>
-              </a:rPr>
-              <a:t>jQuery</a:t>
             </a:r>
             <a:endParaRPr lang="en-GB" sz="1000" dirty="0">
               <a:solidFill>
@@ -4727,7 +4736,7 @@
         </p:nvCxnSpPr>
         <p:spPr>
           <a:xfrm>
-            <a:off x="5193430" y="9188266"/>
+            <a:off x="5193430" y="9201472"/>
             <a:ext cx="503822" cy="0"/>
           </a:xfrm>
           <a:prstGeom prst="line">
@@ -5215,6 +5224,47 @@
                 <a:latin typeface="Raleway-v4020 Medium" panose="00000600000000000000" pitchFamily="50" charset="0"/>
               </a:rPr>
               <a:t>07999 688 021</a:t>
+            </a:r>
+            <a:endParaRPr lang="en-GB" sz="1000" dirty="0">
+              <a:solidFill>
+                <a:srgbClr val="DADAD9"/>
+              </a:solidFill>
+              <a:latin typeface="Raleway-v4020 Medium" panose="00000600000000000000" pitchFamily="50" charset="0"/>
+            </a:endParaRPr>
+          </a:p>
+        </p:txBody>
+      </p:sp>
+      <p:sp>
+        <p:nvSpPr>
+          <p:cNvPr id="44" name="TextBox 43"/>
+          <p:cNvSpPr txBox="1"/>
+          <p:nvPr/>
+        </p:nvSpPr>
+        <p:spPr>
+          <a:xfrm>
+            <a:off x="2435224" y="746339"/>
+            <a:ext cx="1987551" cy="246221"/>
+          </a:xfrm>
+          <a:prstGeom prst="rect">
+            <a:avLst/>
+          </a:prstGeom>
+          <a:noFill/>
+        </p:spPr>
+        <p:txBody>
+          <a:bodyPr wrap="square" rtlCol="0">
+            <a:spAutoFit/>
+          </a:bodyPr>
+          <a:lstStyle/>
+          <a:p>
+            <a:pPr algn="ctr"/>
+            <a:r>
+              <a:rPr lang="en-GB" sz="1000" dirty="0" smtClean="0">
+                <a:solidFill>
+                  <a:srgbClr val="DADAD9"/>
+                </a:solidFill>
+                <a:latin typeface="Raleway-v4020 Medium" panose="00000600000000000000" pitchFamily="50" charset="0"/>
+              </a:rPr>
+              <a:t>jamieabraham.com</a:t>
             </a:r>
             <a:endParaRPr lang="en-GB" sz="1000" dirty="0">
               <a:solidFill>

</xml_diff>